<commit_message>
doc: added final pptx
</commit_message>
<xml_diff>
--- a/Notes.pptx
+++ b/Notes.pptx
@@ -17,6 +17,9 @@
     <p:sldId id="265" r:id="rId11"/>
     <p:sldId id="266" r:id="rId12"/>
     <p:sldId id="267" r:id="rId13"/>
+    <p:sldId id="268" r:id="rId14"/>
+    <p:sldId id="269" r:id="rId15"/>
+    <p:sldId id="270" r:id="rId16"/>
   </p:sldIdLst>
   <p:sldSz cx="12192000" cy="6858000"/>
   <p:notesSz cx="6858000" cy="9144000"/>
@@ -272,7 +275,7 @@
           <a:p>
             <a:fld id="{8FB22AAB-D15E-4FD4-99B4-67730B518873}" type="datetimeFigureOut">
               <a:rPr lang="fr-FR" smtClean="0"/>
-              <a:t>21/06/2022</a:t>
+              <a:t>22/06/2022</a:t>
             </a:fld>
             <a:endParaRPr lang="fr-FR"/>
           </a:p>
@@ -472,7 +475,7 @@
           <a:p>
             <a:fld id="{8FB22AAB-D15E-4FD4-99B4-67730B518873}" type="datetimeFigureOut">
               <a:rPr lang="fr-FR" smtClean="0"/>
-              <a:t>21/06/2022</a:t>
+              <a:t>22/06/2022</a:t>
             </a:fld>
             <a:endParaRPr lang="fr-FR"/>
           </a:p>
@@ -682,7 +685,7 @@
           <a:p>
             <a:fld id="{8FB22AAB-D15E-4FD4-99B4-67730B518873}" type="datetimeFigureOut">
               <a:rPr lang="fr-FR" smtClean="0"/>
-              <a:t>21/06/2022</a:t>
+              <a:t>22/06/2022</a:t>
             </a:fld>
             <a:endParaRPr lang="fr-FR"/>
           </a:p>
@@ -882,7 +885,7 @@
           <a:p>
             <a:fld id="{8FB22AAB-D15E-4FD4-99B4-67730B518873}" type="datetimeFigureOut">
               <a:rPr lang="fr-FR" smtClean="0"/>
-              <a:t>21/06/2022</a:t>
+              <a:t>22/06/2022</a:t>
             </a:fld>
             <a:endParaRPr lang="fr-FR"/>
           </a:p>
@@ -1158,7 +1161,7 @@
           <a:p>
             <a:fld id="{8FB22AAB-D15E-4FD4-99B4-67730B518873}" type="datetimeFigureOut">
               <a:rPr lang="fr-FR" smtClean="0"/>
-              <a:t>21/06/2022</a:t>
+              <a:t>22/06/2022</a:t>
             </a:fld>
             <a:endParaRPr lang="fr-FR"/>
           </a:p>
@@ -1426,7 +1429,7 @@
           <a:p>
             <a:fld id="{8FB22AAB-D15E-4FD4-99B4-67730B518873}" type="datetimeFigureOut">
               <a:rPr lang="fr-FR" smtClean="0"/>
-              <a:t>21/06/2022</a:t>
+              <a:t>22/06/2022</a:t>
             </a:fld>
             <a:endParaRPr lang="fr-FR"/>
           </a:p>
@@ -1841,7 +1844,7 @@
           <a:p>
             <a:fld id="{8FB22AAB-D15E-4FD4-99B4-67730B518873}" type="datetimeFigureOut">
               <a:rPr lang="fr-FR" smtClean="0"/>
-              <a:t>21/06/2022</a:t>
+              <a:t>22/06/2022</a:t>
             </a:fld>
             <a:endParaRPr lang="fr-FR"/>
           </a:p>
@@ -1983,7 +1986,7 @@
           <a:p>
             <a:fld id="{8FB22AAB-D15E-4FD4-99B4-67730B518873}" type="datetimeFigureOut">
               <a:rPr lang="fr-FR" smtClean="0"/>
-              <a:t>21/06/2022</a:t>
+              <a:t>22/06/2022</a:t>
             </a:fld>
             <a:endParaRPr lang="fr-FR"/>
           </a:p>
@@ -2096,7 +2099,7 @@
           <a:p>
             <a:fld id="{8FB22AAB-D15E-4FD4-99B4-67730B518873}" type="datetimeFigureOut">
               <a:rPr lang="fr-FR" smtClean="0"/>
-              <a:t>21/06/2022</a:t>
+              <a:t>22/06/2022</a:t>
             </a:fld>
             <a:endParaRPr lang="fr-FR"/>
           </a:p>
@@ -2409,7 +2412,7 @@
           <a:p>
             <a:fld id="{8FB22AAB-D15E-4FD4-99B4-67730B518873}" type="datetimeFigureOut">
               <a:rPr lang="fr-FR" smtClean="0"/>
-              <a:t>21/06/2022</a:t>
+              <a:t>22/06/2022</a:t>
             </a:fld>
             <a:endParaRPr lang="fr-FR"/>
           </a:p>
@@ -2698,7 +2701,7 @@
           <a:p>
             <a:fld id="{8FB22AAB-D15E-4FD4-99B4-67730B518873}" type="datetimeFigureOut">
               <a:rPr lang="fr-FR" smtClean="0"/>
-              <a:t>21/06/2022</a:t>
+              <a:t>22/06/2022</a:t>
             </a:fld>
             <a:endParaRPr lang="fr-FR"/>
           </a:p>
@@ -2941,7 +2944,7 @@
           <a:p>
             <a:fld id="{8FB22AAB-D15E-4FD4-99B4-67730B518873}" type="datetimeFigureOut">
               <a:rPr lang="fr-FR" smtClean="0"/>
-              <a:t>21/06/2022</a:t>
+              <a:t>22/06/2022</a:t>
             </a:fld>
             <a:endParaRPr lang="fr-FR"/>
           </a:p>
@@ -3607,6 +3610,15 @@
             <a:endParaRPr lang="fr-FR" dirty="0"/>
           </a:p>
           <a:p>
+            <a:r>
+              <a:rPr lang="fr-FR" dirty="0">
+                <a:hlinkClick r:id="rId5"/>
+              </a:rPr>
+              <a:t>https://refactoring.guru/fr/refactoring</a:t>
+            </a:r>
+            <a:endParaRPr lang="fr-FR" dirty="0"/>
+          </a:p>
+          <a:p>
             <a:endParaRPr lang="fr-FR" dirty="0"/>
           </a:p>
         </p:txBody>
@@ -3732,7 +3744,7 @@
             </a:r>
             <a:r>
               <a:rPr lang="en-US" dirty="0" err="1"/>
-              <a:t>libraire</a:t>
+              <a:t>librairie</a:t>
             </a:r>
             <a:r>
               <a:rPr lang="en-US" dirty="0"/>
@@ -3794,6 +3806,32 @@
             <a:r>
               <a:rPr lang="fr-FR" dirty="0"/>
               <a:t>)</a:t>
+            </a:r>
+          </a:p>
+          <a:p>
+            <a:r>
+              <a:rPr lang="fr-FR" dirty="0" err="1"/>
+              <a:t>npm</a:t>
+            </a:r>
+            <a:r>
+              <a:rPr lang="fr-FR" dirty="0"/>
+              <a:t> </a:t>
+            </a:r>
+            <a:r>
+              <a:rPr lang="fr-FR" dirty="0" err="1"/>
+              <a:t>install</a:t>
+            </a:r>
+            <a:r>
+              <a:rPr lang="fr-FR" dirty="0"/>
+              <a:t> </a:t>
+            </a:r>
+            <a:r>
+              <a:rPr lang="fr-FR" dirty="0" err="1"/>
+              <a:t>typescript</a:t>
+            </a:r>
+            <a:r>
+              <a:rPr lang="fr-FR" dirty="0"/>
+              <a:t> -D</a:t>
             </a:r>
           </a:p>
         </p:txBody>
@@ -3802,6 +3840,2150 @@
     <p:extLst>
       <p:ext uri="{BB962C8B-B14F-4D97-AF65-F5344CB8AC3E}">
         <p14:creationId xmlns:p14="http://schemas.microsoft.com/office/powerpoint/2010/main" val="4167533685"/>
+      </p:ext>
+    </p:extLst>
+  </p:cSld>
+  <p:clrMapOvr>
+    <a:masterClrMapping/>
+  </p:clrMapOvr>
+</p:sld>
+</file>
+
+<file path=ppt/slides/slide13.xml><?xml version="1.0" encoding="utf-8"?>
+<p:sld xmlns:a="http://schemas.openxmlformats.org/drawingml/2006/main" xmlns:r="http://schemas.openxmlformats.org/officeDocument/2006/relationships" xmlns:p="http://schemas.openxmlformats.org/presentationml/2006/main">
+  <p:cSld>
+    <p:spTree>
+      <p:nvGrpSpPr>
+        <p:cNvPr id="1" name=""/>
+        <p:cNvGrpSpPr/>
+        <p:nvPr/>
+      </p:nvGrpSpPr>
+      <p:grpSpPr>
+        <a:xfrm>
+          <a:off x="0" y="0"/>
+          <a:ext cx="0" cy="0"/>
+          <a:chOff x="0" y="0"/>
+          <a:chExt cx="0" cy="0"/>
+        </a:xfrm>
+      </p:grpSpPr>
+      <p:sp>
+        <p:nvSpPr>
+          <p:cNvPr id="2" name="Title 1">
+            <a:extLst>
+              <a:ext uri="{FF2B5EF4-FFF2-40B4-BE49-F238E27FC236}">
+                <a16:creationId xmlns:a16="http://schemas.microsoft.com/office/drawing/2014/main" id="{35DA36F1-A38D-49E5-9F4C-5CB8EDE0850A}"/>
+              </a:ext>
+            </a:extLst>
+          </p:cNvPr>
+          <p:cNvSpPr>
+            <a:spLocks noGrp="1"/>
+          </p:cNvSpPr>
+          <p:nvPr>
+            <p:ph type="title"/>
+          </p:nvPr>
+        </p:nvSpPr>
+        <p:spPr/>
+        <p:txBody>
+          <a:bodyPr/>
+          <a:lstStyle/>
+          <a:p>
+            <a:r>
+              <a:rPr lang="fr-FR" dirty="0"/>
+              <a:t>Framework Front End</a:t>
+            </a:r>
+          </a:p>
+        </p:txBody>
+      </p:sp>
+      <p:sp>
+        <p:nvSpPr>
+          <p:cNvPr id="3" name="Content Placeholder 2">
+            <a:extLst>
+              <a:ext uri="{FF2B5EF4-FFF2-40B4-BE49-F238E27FC236}">
+                <a16:creationId xmlns:a16="http://schemas.microsoft.com/office/drawing/2014/main" id="{C9AA93C2-62D8-44EA-BC0F-0B0592F368A5}"/>
+              </a:ext>
+            </a:extLst>
+          </p:cNvPr>
+          <p:cNvSpPr>
+            <a:spLocks noGrp="1"/>
+          </p:cNvSpPr>
+          <p:nvPr>
+            <p:ph idx="1"/>
+          </p:nvPr>
+        </p:nvSpPr>
+        <p:spPr/>
+        <p:txBody>
+          <a:bodyPr/>
+          <a:lstStyle/>
+          <a:p>
+            <a:r>
+              <a:rPr lang="fr-FR" dirty="0" err="1"/>
+              <a:t>Angular</a:t>
+            </a:r>
+            <a:r>
+              <a:rPr lang="fr-FR" dirty="0"/>
+              <a:t> (Google)</a:t>
+            </a:r>
+          </a:p>
+          <a:p>
+            <a:r>
+              <a:rPr lang="fr-FR" dirty="0" err="1"/>
+              <a:t>React</a:t>
+            </a:r>
+            <a:r>
+              <a:rPr lang="fr-FR" dirty="0"/>
+              <a:t> (Facebook)</a:t>
+            </a:r>
+          </a:p>
+          <a:p>
+            <a:r>
+              <a:rPr lang="fr-FR" dirty="0" err="1"/>
+              <a:t>VueJS</a:t>
+            </a:r>
+            <a:r>
+              <a:rPr lang="fr-FR" dirty="0"/>
+              <a:t> (no </a:t>
+            </a:r>
+            <a:r>
+              <a:rPr lang="fr-FR" dirty="0" err="1"/>
+              <a:t>name</a:t>
+            </a:r>
+            <a:r>
+              <a:rPr lang="fr-FR" dirty="0"/>
+              <a:t>)</a:t>
+            </a:r>
+          </a:p>
+          <a:p>
+            <a:r>
+              <a:rPr lang="fr-FR" dirty="0"/>
+              <a:t>Svelte (no </a:t>
+            </a:r>
+            <a:r>
+              <a:rPr lang="fr-FR" dirty="0" err="1"/>
+              <a:t>name</a:t>
+            </a:r>
+            <a:r>
+              <a:rPr lang="fr-FR" dirty="0"/>
+              <a:t>)</a:t>
+            </a:r>
+          </a:p>
+        </p:txBody>
+      </p:sp>
+    </p:spTree>
+    <p:extLst>
+      <p:ext uri="{BB962C8B-B14F-4D97-AF65-F5344CB8AC3E}">
+        <p14:creationId xmlns:p14="http://schemas.microsoft.com/office/powerpoint/2010/main" val="2367020476"/>
+      </p:ext>
+    </p:extLst>
+  </p:cSld>
+  <p:clrMapOvr>
+    <a:masterClrMapping/>
+  </p:clrMapOvr>
+</p:sld>
+</file>
+
+<file path=ppt/slides/slide14.xml><?xml version="1.0" encoding="utf-8"?>
+<p:sld xmlns:a="http://schemas.openxmlformats.org/drawingml/2006/main" xmlns:r="http://schemas.openxmlformats.org/officeDocument/2006/relationships" xmlns:p="http://schemas.openxmlformats.org/presentationml/2006/main">
+  <p:cSld>
+    <p:spTree>
+      <p:nvGrpSpPr>
+        <p:cNvPr id="1" name=""/>
+        <p:cNvGrpSpPr/>
+        <p:nvPr/>
+      </p:nvGrpSpPr>
+      <p:grpSpPr>
+        <a:xfrm>
+          <a:off x="0" y="0"/>
+          <a:ext cx="0" cy="0"/>
+          <a:chOff x="0" y="0"/>
+          <a:chExt cx="0" cy="0"/>
+        </a:xfrm>
+      </p:grpSpPr>
+      <p:cxnSp>
+        <p:nvCxnSpPr>
+          <p:cNvPr id="7" name="Straight Arrow Connector 6">
+            <a:extLst>
+              <a:ext uri="{FF2B5EF4-FFF2-40B4-BE49-F238E27FC236}">
+                <a16:creationId xmlns:a16="http://schemas.microsoft.com/office/drawing/2014/main" id="{67D3EA27-6DB8-4B2E-948B-D97D20210462}"/>
+              </a:ext>
+            </a:extLst>
+          </p:cNvPr>
+          <p:cNvCxnSpPr>
+            <a:cxnSpLocks/>
+          </p:cNvCxnSpPr>
+          <p:nvPr/>
+        </p:nvCxnSpPr>
+        <p:spPr>
+          <a:xfrm>
+            <a:off x="1196088" y="1191753"/>
+            <a:ext cx="0" cy="5083371"/>
+          </a:xfrm>
+          <a:prstGeom prst="straightConnector1">
+            <a:avLst/>
+          </a:prstGeom>
+          <a:ln w="76200">
+            <a:solidFill>
+              <a:schemeClr val="accent1"/>
+            </a:solidFill>
+            <a:tailEnd type="triangle"/>
+          </a:ln>
+        </p:spPr>
+        <p:style>
+          <a:lnRef idx="1">
+            <a:schemeClr val="accent1"/>
+          </a:lnRef>
+          <a:fillRef idx="0">
+            <a:schemeClr val="accent1"/>
+          </a:fillRef>
+          <a:effectRef idx="0">
+            <a:schemeClr val="accent1"/>
+          </a:effectRef>
+          <a:fontRef idx="minor">
+            <a:schemeClr val="tx1"/>
+          </a:fontRef>
+        </p:style>
+      </p:cxnSp>
+      <p:sp>
+        <p:nvSpPr>
+          <p:cNvPr id="9" name="TextBox 8">
+            <a:extLst>
+              <a:ext uri="{FF2B5EF4-FFF2-40B4-BE49-F238E27FC236}">
+                <a16:creationId xmlns:a16="http://schemas.microsoft.com/office/drawing/2014/main" id="{F505E57C-C2C6-40EC-83B5-A77E5F534ED4}"/>
+              </a:ext>
+            </a:extLst>
+          </p:cNvPr>
+          <p:cNvSpPr txBox="1"/>
+          <p:nvPr/>
+        </p:nvSpPr>
+        <p:spPr>
+          <a:xfrm>
+            <a:off x="736721" y="697717"/>
+            <a:ext cx="2275366" cy="369332"/>
+          </a:xfrm>
+          <a:prstGeom prst="rect">
+            <a:avLst/>
+          </a:prstGeom>
+          <a:noFill/>
+        </p:spPr>
+        <p:txBody>
+          <a:bodyPr wrap="none" rtlCol="0">
+            <a:spAutoFit/>
+          </a:bodyPr>
+          <a:lstStyle/>
+          <a:p>
+            <a:r>
+              <a:rPr lang="fr-FR" dirty="0" err="1"/>
+              <a:t>function</a:t>
+            </a:r>
+            <a:r>
+              <a:rPr lang="fr-FR" dirty="0"/>
+              <a:t> </a:t>
+            </a:r>
+            <a:r>
+              <a:rPr lang="fr-FR" dirty="0" err="1"/>
+              <a:t>doSomething</a:t>
+            </a:r>
+            <a:endParaRPr lang="fr-FR" dirty="0"/>
+          </a:p>
+        </p:txBody>
+      </p:sp>
+      <p:cxnSp>
+        <p:nvCxnSpPr>
+          <p:cNvPr id="11" name="Straight Arrow Connector 10">
+            <a:extLst>
+              <a:ext uri="{FF2B5EF4-FFF2-40B4-BE49-F238E27FC236}">
+                <a16:creationId xmlns:a16="http://schemas.microsoft.com/office/drawing/2014/main" id="{872ED8BF-2D86-4B9E-A05E-D38AF76C3209}"/>
+              </a:ext>
+            </a:extLst>
+          </p:cNvPr>
+          <p:cNvCxnSpPr/>
+          <p:nvPr/>
+        </p:nvCxnSpPr>
+        <p:spPr>
+          <a:xfrm>
+            <a:off x="1243758" y="1620785"/>
+            <a:ext cx="827727" cy="572041"/>
+          </a:xfrm>
+          <a:prstGeom prst="straightConnector1">
+            <a:avLst/>
+          </a:prstGeom>
+          <a:ln w="76200">
+            <a:solidFill>
+              <a:schemeClr val="accent1"/>
+            </a:solidFill>
+            <a:tailEnd type="triangle"/>
+          </a:ln>
+        </p:spPr>
+        <p:style>
+          <a:lnRef idx="1">
+            <a:schemeClr val="accent1"/>
+          </a:lnRef>
+          <a:fillRef idx="0">
+            <a:schemeClr val="accent1"/>
+          </a:fillRef>
+          <a:effectRef idx="0">
+            <a:schemeClr val="accent1"/>
+          </a:effectRef>
+          <a:fontRef idx="minor">
+            <a:schemeClr val="tx1"/>
+          </a:fontRef>
+        </p:style>
+      </p:cxnSp>
+      <p:cxnSp>
+        <p:nvCxnSpPr>
+          <p:cNvPr id="13" name="Straight Arrow Connector 12">
+            <a:extLst>
+              <a:ext uri="{FF2B5EF4-FFF2-40B4-BE49-F238E27FC236}">
+                <a16:creationId xmlns:a16="http://schemas.microsoft.com/office/drawing/2014/main" id="{0E18F3A4-EC83-4782-A47D-289F4AF8DB3B}"/>
+              </a:ext>
+            </a:extLst>
+          </p:cNvPr>
+          <p:cNvCxnSpPr/>
+          <p:nvPr/>
+        </p:nvCxnSpPr>
+        <p:spPr>
+          <a:xfrm>
+            <a:off x="1196088" y="2955549"/>
+            <a:ext cx="732386" cy="468034"/>
+          </a:xfrm>
+          <a:prstGeom prst="straightConnector1">
+            <a:avLst/>
+          </a:prstGeom>
+          <a:ln w="76200">
+            <a:solidFill>
+              <a:schemeClr val="accent1"/>
+            </a:solidFill>
+            <a:tailEnd type="triangle"/>
+          </a:ln>
+        </p:spPr>
+        <p:style>
+          <a:lnRef idx="1">
+            <a:schemeClr val="accent1"/>
+          </a:lnRef>
+          <a:fillRef idx="0">
+            <a:schemeClr val="accent1"/>
+          </a:fillRef>
+          <a:effectRef idx="0">
+            <a:schemeClr val="accent1"/>
+          </a:effectRef>
+          <a:fontRef idx="minor">
+            <a:schemeClr val="tx1"/>
+          </a:fontRef>
+        </p:style>
+      </p:cxnSp>
+      <p:cxnSp>
+        <p:nvCxnSpPr>
+          <p:cNvPr id="15" name="Straight Arrow Connector 14">
+            <a:extLst>
+              <a:ext uri="{FF2B5EF4-FFF2-40B4-BE49-F238E27FC236}">
+                <a16:creationId xmlns:a16="http://schemas.microsoft.com/office/drawing/2014/main" id="{10662B33-E900-4D21-ABEA-F605AC256BD4}"/>
+              </a:ext>
+            </a:extLst>
+          </p:cNvPr>
+          <p:cNvCxnSpPr/>
+          <p:nvPr/>
+        </p:nvCxnSpPr>
+        <p:spPr>
+          <a:xfrm>
+            <a:off x="1196088" y="4030294"/>
+            <a:ext cx="676049" cy="494036"/>
+          </a:xfrm>
+          <a:prstGeom prst="straightConnector1">
+            <a:avLst/>
+          </a:prstGeom>
+          <a:ln w="76200">
+            <a:solidFill>
+              <a:schemeClr val="accent1"/>
+            </a:solidFill>
+            <a:tailEnd type="triangle"/>
+          </a:ln>
+        </p:spPr>
+        <p:style>
+          <a:lnRef idx="1">
+            <a:schemeClr val="accent1"/>
+          </a:lnRef>
+          <a:fillRef idx="0">
+            <a:schemeClr val="accent1"/>
+          </a:fillRef>
+          <a:effectRef idx="0">
+            <a:schemeClr val="accent1"/>
+          </a:effectRef>
+          <a:fontRef idx="minor">
+            <a:schemeClr val="tx1"/>
+          </a:fontRef>
+        </p:style>
+      </p:cxnSp>
+      <p:cxnSp>
+        <p:nvCxnSpPr>
+          <p:cNvPr id="17" name="Straight Arrow Connector 16">
+            <a:extLst>
+              <a:ext uri="{FF2B5EF4-FFF2-40B4-BE49-F238E27FC236}">
+                <a16:creationId xmlns:a16="http://schemas.microsoft.com/office/drawing/2014/main" id="{149D7D40-DD0E-4320-850E-F847C0BEEFDD}"/>
+              </a:ext>
+            </a:extLst>
+          </p:cNvPr>
+          <p:cNvCxnSpPr/>
+          <p:nvPr/>
+        </p:nvCxnSpPr>
+        <p:spPr>
+          <a:xfrm>
+            <a:off x="1196088" y="4801683"/>
+            <a:ext cx="875397" cy="676050"/>
+          </a:xfrm>
+          <a:prstGeom prst="straightConnector1">
+            <a:avLst/>
+          </a:prstGeom>
+          <a:ln w="76200">
+            <a:solidFill>
+              <a:schemeClr val="accent1"/>
+            </a:solidFill>
+            <a:tailEnd type="triangle"/>
+          </a:ln>
+        </p:spPr>
+        <p:style>
+          <a:lnRef idx="1">
+            <a:schemeClr val="accent1"/>
+          </a:lnRef>
+          <a:fillRef idx="0">
+            <a:schemeClr val="accent1"/>
+          </a:fillRef>
+          <a:effectRef idx="0">
+            <a:schemeClr val="accent1"/>
+          </a:effectRef>
+          <a:fontRef idx="minor">
+            <a:schemeClr val="tx1"/>
+          </a:fontRef>
+        </p:style>
+      </p:cxnSp>
+      <p:cxnSp>
+        <p:nvCxnSpPr>
+          <p:cNvPr id="19" name="Straight Arrow Connector 18">
+            <a:extLst>
+              <a:ext uri="{FF2B5EF4-FFF2-40B4-BE49-F238E27FC236}">
+                <a16:creationId xmlns:a16="http://schemas.microsoft.com/office/drawing/2014/main" id="{744506FD-3CFD-4CF6-919A-A15889F52D8F}"/>
+              </a:ext>
+            </a:extLst>
+          </p:cNvPr>
+          <p:cNvCxnSpPr>
+            <a:cxnSpLocks/>
+          </p:cNvCxnSpPr>
+          <p:nvPr/>
+        </p:nvCxnSpPr>
+        <p:spPr>
+          <a:xfrm>
+            <a:off x="6621816" y="1291427"/>
+            <a:ext cx="0" cy="1044410"/>
+          </a:xfrm>
+          <a:prstGeom prst="straightConnector1">
+            <a:avLst/>
+          </a:prstGeom>
+          <a:ln w="76200">
+            <a:solidFill>
+              <a:schemeClr val="accent1"/>
+            </a:solidFill>
+            <a:tailEnd type="triangle"/>
+          </a:ln>
+        </p:spPr>
+        <p:style>
+          <a:lnRef idx="1">
+            <a:schemeClr val="accent1"/>
+          </a:lnRef>
+          <a:fillRef idx="0">
+            <a:schemeClr val="accent1"/>
+          </a:fillRef>
+          <a:effectRef idx="0">
+            <a:schemeClr val="accent1"/>
+          </a:effectRef>
+          <a:fontRef idx="minor">
+            <a:schemeClr val="tx1"/>
+          </a:fontRef>
+        </p:style>
+      </p:cxnSp>
+      <p:cxnSp>
+        <p:nvCxnSpPr>
+          <p:cNvPr id="22" name="Straight Arrow Connector 21">
+            <a:extLst>
+              <a:ext uri="{FF2B5EF4-FFF2-40B4-BE49-F238E27FC236}">
+                <a16:creationId xmlns:a16="http://schemas.microsoft.com/office/drawing/2014/main" id="{32315FA9-35A1-4262-B72B-347110F30A8E}"/>
+              </a:ext>
+            </a:extLst>
+          </p:cNvPr>
+          <p:cNvCxnSpPr/>
+          <p:nvPr/>
+        </p:nvCxnSpPr>
+        <p:spPr>
+          <a:xfrm>
+            <a:off x="6656485" y="2344504"/>
+            <a:ext cx="1148417" cy="459367"/>
+          </a:xfrm>
+          <a:prstGeom prst="straightConnector1">
+            <a:avLst/>
+          </a:prstGeom>
+          <a:ln w="76200">
+            <a:solidFill>
+              <a:schemeClr val="accent1"/>
+            </a:solidFill>
+            <a:tailEnd type="triangle"/>
+          </a:ln>
+        </p:spPr>
+        <p:style>
+          <a:lnRef idx="1">
+            <a:schemeClr val="accent1"/>
+          </a:lnRef>
+          <a:fillRef idx="0">
+            <a:schemeClr val="accent1"/>
+          </a:fillRef>
+          <a:effectRef idx="0">
+            <a:schemeClr val="accent1"/>
+          </a:effectRef>
+          <a:fontRef idx="minor">
+            <a:schemeClr val="tx1"/>
+          </a:fontRef>
+        </p:style>
+      </p:cxnSp>
+      <p:cxnSp>
+        <p:nvCxnSpPr>
+          <p:cNvPr id="24" name="Straight Arrow Connector 23">
+            <a:extLst>
+              <a:ext uri="{FF2B5EF4-FFF2-40B4-BE49-F238E27FC236}">
+                <a16:creationId xmlns:a16="http://schemas.microsoft.com/office/drawing/2014/main" id="{88EC529D-AA58-41E3-81F5-1C44D8065111}"/>
+              </a:ext>
+            </a:extLst>
+          </p:cNvPr>
+          <p:cNvCxnSpPr/>
+          <p:nvPr/>
+        </p:nvCxnSpPr>
+        <p:spPr>
+          <a:xfrm>
+            <a:off x="6587147" y="2691196"/>
+            <a:ext cx="1083412" cy="459367"/>
+          </a:xfrm>
+          <a:prstGeom prst="straightConnector1">
+            <a:avLst/>
+          </a:prstGeom>
+          <a:ln w="76200">
+            <a:solidFill>
+              <a:schemeClr val="accent1"/>
+            </a:solidFill>
+            <a:tailEnd type="triangle"/>
+          </a:ln>
+        </p:spPr>
+        <p:style>
+          <a:lnRef idx="1">
+            <a:schemeClr val="accent1"/>
+          </a:lnRef>
+          <a:fillRef idx="0">
+            <a:schemeClr val="accent1"/>
+          </a:fillRef>
+          <a:effectRef idx="0">
+            <a:schemeClr val="accent1"/>
+          </a:effectRef>
+          <a:fontRef idx="minor">
+            <a:schemeClr val="tx1"/>
+          </a:fontRef>
+        </p:style>
+      </p:cxnSp>
+      <p:cxnSp>
+        <p:nvCxnSpPr>
+          <p:cNvPr id="26" name="Straight Arrow Connector 25">
+            <a:extLst>
+              <a:ext uri="{FF2B5EF4-FFF2-40B4-BE49-F238E27FC236}">
+                <a16:creationId xmlns:a16="http://schemas.microsoft.com/office/drawing/2014/main" id="{B9FF6821-7757-434C-B469-A9F36FA82AD4}"/>
+              </a:ext>
+            </a:extLst>
+          </p:cNvPr>
+          <p:cNvCxnSpPr>
+            <a:cxnSpLocks/>
+          </p:cNvCxnSpPr>
+          <p:nvPr/>
+        </p:nvCxnSpPr>
+        <p:spPr>
+          <a:xfrm flipH="1">
+            <a:off x="7670559" y="3215568"/>
+            <a:ext cx="4334" cy="814726"/>
+          </a:xfrm>
+          <a:prstGeom prst="straightConnector1">
+            <a:avLst/>
+          </a:prstGeom>
+          <a:ln w="76200">
+            <a:solidFill>
+              <a:schemeClr val="accent1"/>
+            </a:solidFill>
+            <a:tailEnd type="triangle"/>
+          </a:ln>
+        </p:spPr>
+        <p:style>
+          <a:lnRef idx="1">
+            <a:schemeClr val="accent1"/>
+          </a:lnRef>
+          <a:fillRef idx="0">
+            <a:schemeClr val="accent1"/>
+          </a:fillRef>
+          <a:effectRef idx="0">
+            <a:schemeClr val="accent1"/>
+          </a:effectRef>
+          <a:fontRef idx="minor">
+            <a:schemeClr val="tx1"/>
+          </a:fontRef>
+        </p:style>
+      </p:cxnSp>
+      <p:cxnSp>
+        <p:nvCxnSpPr>
+          <p:cNvPr id="29" name="Straight Arrow Connector 28">
+            <a:extLst>
+              <a:ext uri="{FF2B5EF4-FFF2-40B4-BE49-F238E27FC236}">
+                <a16:creationId xmlns:a16="http://schemas.microsoft.com/office/drawing/2014/main" id="{E89DF678-9B5C-4ACF-959F-B0DC59E56677}"/>
+              </a:ext>
+            </a:extLst>
+          </p:cNvPr>
+          <p:cNvCxnSpPr/>
+          <p:nvPr/>
+        </p:nvCxnSpPr>
+        <p:spPr>
+          <a:xfrm>
+            <a:off x="7670559" y="4030294"/>
+            <a:ext cx="914400" cy="325024"/>
+          </a:xfrm>
+          <a:prstGeom prst="straightConnector1">
+            <a:avLst/>
+          </a:prstGeom>
+          <a:ln w="76200">
+            <a:solidFill>
+              <a:schemeClr val="accent1"/>
+            </a:solidFill>
+            <a:tailEnd type="triangle"/>
+          </a:ln>
+        </p:spPr>
+        <p:style>
+          <a:lnRef idx="1">
+            <a:schemeClr val="accent1"/>
+          </a:lnRef>
+          <a:fillRef idx="0">
+            <a:schemeClr val="accent1"/>
+          </a:fillRef>
+          <a:effectRef idx="0">
+            <a:schemeClr val="accent1"/>
+          </a:effectRef>
+          <a:fontRef idx="minor">
+            <a:schemeClr val="tx1"/>
+          </a:fontRef>
+        </p:style>
+      </p:cxnSp>
+      <p:cxnSp>
+        <p:nvCxnSpPr>
+          <p:cNvPr id="31" name="Straight Arrow Connector 30">
+            <a:extLst>
+              <a:ext uri="{FF2B5EF4-FFF2-40B4-BE49-F238E27FC236}">
+                <a16:creationId xmlns:a16="http://schemas.microsoft.com/office/drawing/2014/main" id="{24DF8826-E768-4794-8E84-0B9812B5102C}"/>
+              </a:ext>
+            </a:extLst>
+          </p:cNvPr>
+          <p:cNvCxnSpPr/>
+          <p:nvPr/>
+        </p:nvCxnSpPr>
+        <p:spPr>
+          <a:xfrm>
+            <a:off x="7670559" y="4242643"/>
+            <a:ext cx="879731" cy="359693"/>
+          </a:xfrm>
+          <a:prstGeom prst="straightConnector1">
+            <a:avLst/>
+          </a:prstGeom>
+          <a:ln w="76200">
+            <a:solidFill>
+              <a:schemeClr val="accent1"/>
+            </a:solidFill>
+            <a:tailEnd type="triangle"/>
+          </a:ln>
+        </p:spPr>
+        <p:style>
+          <a:lnRef idx="1">
+            <a:schemeClr val="accent1"/>
+          </a:lnRef>
+          <a:fillRef idx="0">
+            <a:schemeClr val="accent1"/>
+          </a:fillRef>
+          <a:effectRef idx="0">
+            <a:schemeClr val="accent1"/>
+          </a:effectRef>
+          <a:fontRef idx="minor">
+            <a:schemeClr val="tx1"/>
+          </a:fontRef>
+        </p:style>
+      </p:cxnSp>
+      <p:cxnSp>
+        <p:nvCxnSpPr>
+          <p:cNvPr id="33" name="Straight Arrow Connector 32">
+            <a:extLst>
+              <a:ext uri="{FF2B5EF4-FFF2-40B4-BE49-F238E27FC236}">
+                <a16:creationId xmlns:a16="http://schemas.microsoft.com/office/drawing/2014/main" id="{2121DAEC-42B7-4F14-ADB2-EE89F5B90F83}"/>
+              </a:ext>
+            </a:extLst>
+          </p:cNvPr>
+          <p:cNvCxnSpPr/>
+          <p:nvPr/>
+        </p:nvCxnSpPr>
+        <p:spPr>
+          <a:xfrm>
+            <a:off x="8550290" y="4667340"/>
+            <a:ext cx="0" cy="810393"/>
+          </a:xfrm>
+          <a:prstGeom prst="straightConnector1">
+            <a:avLst/>
+          </a:prstGeom>
+          <a:ln w="76200">
+            <a:solidFill>
+              <a:schemeClr val="accent1"/>
+            </a:solidFill>
+            <a:tailEnd type="triangle"/>
+          </a:ln>
+        </p:spPr>
+        <p:style>
+          <a:lnRef idx="1">
+            <a:schemeClr val="accent1"/>
+          </a:lnRef>
+          <a:fillRef idx="0">
+            <a:schemeClr val="accent1"/>
+          </a:fillRef>
+          <a:effectRef idx="0">
+            <a:schemeClr val="accent1"/>
+          </a:effectRef>
+          <a:fontRef idx="minor">
+            <a:schemeClr val="tx1"/>
+          </a:fontRef>
+        </p:style>
+      </p:cxnSp>
+      <p:cxnSp>
+        <p:nvCxnSpPr>
+          <p:cNvPr id="35" name="Straight Arrow Connector 34">
+            <a:extLst>
+              <a:ext uri="{FF2B5EF4-FFF2-40B4-BE49-F238E27FC236}">
+                <a16:creationId xmlns:a16="http://schemas.microsoft.com/office/drawing/2014/main" id="{51AC4884-0CD4-494B-A467-A29FABB89C5D}"/>
+              </a:ext>
+            </a:extLst>
+          </p:cNvPr>
+          <p:cNvCxnSpPr/>
+          <p:nvPr/>
+        </p:nvCxnSpPr>
+        <p:spPr>
+          <a:xfrm>
+            <a:off x="8550290" y="5477733"/>
+            <a:ext cx="723719" cy="307689"/>
+          </a:xfrm>
+          <a:prstGeom prst="straightConnector1">
+            <a:avLst/>
+          </a:prstGeom>
+          <a:ln w="76200">
+            <a:solidFill>
+              <a:schemeClr val="accent1"/>
+            </a:solidFill>
+            <a:tailEnd type="triangle"/>
+          </a:ln>
+        </p:spPr>
+        <p:style>
+          <a:lnRef idx="1">
+            <a:schemeClr val="accent1"/>
+          </a:lnRef>
+          <a:fillRef idx="0">
+            <a:schemeClr val="accent1"/>
+          </a:fillRef>
+          <a:effectRef idx="0">
+            <a:schemeClr val="accent1"/>
+          </a:effectRef>
+          <a:fontRef idx="minor">
+            <a:schemeClr val="tx1"/>
+          </a:fontRef>
+        </p:style>
+      </p:cxnSp>
+      <p:cxnSp>
+        <p:nvCxnSpPr>
+          <p:cNvPr id="37" name="Straight Arrow Connector 36">
+            <a:extLst>
+              <a:ext uri="{FF2B5EF4-FFF2-40B4-BE49-F238E27FC236}">
+                <a16:creationId xmlns:a16="http://schemas.microsoft.com/office/drawing/2014/main" id="{0221AE58-B42E-42BD-9F8C-09D38231F431}"/>
+              </a:ext>
+            </a:extLst>
+          </p:cNvPr>
+          <p:cNvCxnSpPr/>
+          <p:nvPr/>
+        </p:nvCxnSpPr>
+        <p:spPr>
+          <a:xfrm flipH="1">
+            <a:off x="7579552" y="5599076"/>
+            <a:ext cx="879731" cy="286021"/>
+          </a:xfrm>
+          <a:prstGeom prst="straightConnector1">
+            <a:avLst/>
+          </a:prstGeom>
+          <a:ln w="76200">
+            <a:solidFill>
+              <a:schemeClr val="accent1"/>
+            </a:solidFill>
+            <a:tailEnd type="triangle"/>
+          </a:ln>
+        </p:spPr>
+        <p:style>
+          <a:lnRef idx="1">
+            <a:schemeClr val="accent1"/>
+          </a:lnRef>
+          <a:fillRef idx="0">
+            <a:schemeClr val="accent1"/>
+          </a:fillRef>
+          <a:effectRef idx="0">
+            <a:schemeClr val="accent1"/>
+          </a:effectRef>
+          <a:fontRef idx="minor">
+            <a:schemeClr val="tx1"/>
+          </a:fontRef>
+        </p:style>
+      </p:cxnSp>
+      <p:cxnSp>
+        <p:nvCxnSpPr>
+          <p:cNvPr id="39" name="Straight Arrow Connector 38">
+            <a:extLst>
+              <a:ext uri="{FF2B5EF4-FFF2-40B4-BE49-F238E27FC236}">
+                <a16:creationId xmlns:a16="http://schemas.microsoft.com/office/drawing/2014/main" id="{E225A2F7-4B08-4A9A-B056-B736666DF4A0}"/>
+              </a:ext>
+            </a:extLst>
+          </p:cNvPr>
+          <p:cNvCxnSpPr/>
+          <p:nvPr/>
+        </p:nvCxnSpPr>
+        <p:spPr>
+          <a:xfrm>
+            <a:off x="7601221" y="5989103"/>
+            <a:ext cx="0" cy="671716"/>
+          </a:xfrm>
+          <a:prstGeom prst="straightConnector1">
+            <a:avLst/>
+          </a:prstGeom>
+          <a:ln w="76200">
+            <a:solidFill>
+              <a:schemeClr val="accent1"/>
+            </a:solidFill>
+            <a:tailEnd type="triangle"/>
+          </a:ln>
+        </p:spPr>
+        <p:style>
+          <a:lnRef idx="1">
+            <a:schemeClr val="accent1"/>
+          </a:lnRef>
+          <a:fillRef idx="0">
+            <a:schemeClr val="accent1"/>
+          </a:fillRef>
+          <a:effectRef idx="0">
+            <a:schemeClr val="accent1"/>
+          </a:effectRef>
+          <a:fontRef idx="minor">
+            <a:schemeClr val="tx1"/>
+          </a:fontRef>
+        </p:style>
+      </p:cxnSp>
+    </p:spTree>
+    <p:extLst>
+      <p:ext uri="{BB962C8B-B14F-4D97-AF65-F5344CB8AC3E}">
+        <p14:creationId xmlns:p14="http://schemas.microsoft.com/office/powerpoint/2010/main" val="3675190220"/>
+      </p:ext>
+    </p:extLst>
+  </p:cSld>
+  <p:clrMapOvr>
+    <a:masterClrMapping/>
+  </p:clrMapOvr>
+</p:sld>
+</file>
+
+<file path=ppt/slides/slide15.xml><?xml version="1.0" encoding="utf-8"?>
+<p:sld xmlns:a="http://schemas.openxmlformats.org/drawingml/2006/main" xmlns:r="http://schemas.openxmlformats.org/officeDocument/2006/relationships" xmlns:p="http://schemas.openxmlformats.org/presentationml/2006/main">
+  <p:cSld>
+    <p:spTree>
+      <p:nvGrpSpPr>
+        <p:cNvPr id="1" name=""/>
+        <p:cNvGrpSpPr/>
+        <p:nvPr/>
+      </p:nvGrpSpPr>
+      <p:grpSpPr>
+        <a:xfrm>
+          <a:off x="0" y="0"/>
+          <a:ext cx="0" cy="0"/>
+          <a:chOff x="0" y="0"/>
+          <a:chExt cx="0" cy="0"/>
+        </a:xfrm>
+      </p:grpSpPr>
+      <p:cxnSp>
+        <p:nvCxnSpPr>
+          <p:cNvPr id="5" name="Straight Arrow Connector 4">
+            <a:extLst>
+              <a:ext uri="{FF2B5EF4-FFF2-40B4-BE49-F238E27FC236}">
+                <a16:creationId xmlns:a16="http://schemas.microsoft.com/office/drawing/2014/main" id="{041EDEDC-48B8-4257-A6A4-CA54FFF8F72C}"/>
+              </a:ext>
+            </a:extLst>
+          </p:cNvPr>
+          <p:cNvCxnSpPr/>
+          <p:nvPr/>
+        </p:nvCxnSpPr>
+        <p:spPr>
+          <a:xfrm>
+            <a:off x="398696" y="1148417"/>
+            <a:ext cx="11471169" cy="0"/>
+          </a:xfrm>
+          <a:prstGeom prst="straightConnector1">
+            <a:avLst/>
+          </a:prstGeom>
+          <a:ln w="76200">
+            <a:solidFill>
+              <a:schemeClr val="accent1"/>
+            </a:solidFill>
+            <a:tailEnd type="triangle"/>
+          </a:ln>
+        </p:spPr>
+        <p:style>
+          <a:lnRef idx="1">
+            <a:schemeClr val="accent1"/>
+          </a:lnRef>
+          <a:fillRef idx="0">
+            <a:schemeClr val="accent1"/>
+          </a:fillRef>
+          <a:effectRef idx="0">
+            <a:schemeClr val="accent1"/>
+          </a:effectRef>
+          <a:fontRef idx="minor">
+            <a:schemeClr val="tx1"/>
+          </a:fontRef>
+        </p:style>
+      </p:cxnSp>
+      <p:sp>
+        <p:nvSpPr>
+          <p:cNvPr id="6" name="TextBox 5">
+            <a:extLst>
+              <a:ext uri="{FF2B5EF4-FFF2-40B4-BE49-F238E27FC236}">
+                <a16:creationId xmlns:a16="http://schemas.microsoft.com/office/drawing/2014/main" id="{8DF96FFA-CA44-4F3C-AD4A-D229D6CF7665}"/>
+              </a:ext>
+            </a:extLst>
+          </p:cNvPr>
+          <p:cNvSpPr txBox="1"/>
+          <p:nvPr/>
+        </p:nvSpPr>
+        <p:spPr>
+          <a:xfrm>
+            <a:off x="10842791" y="689050"/>
+            <a:ext cx="574196" cy="369332"/>
+          </a:xfrm>
+          <a:prstGeom prst="rect">
+            <a:avLst/>
+          </a:prstGeom>
+          <a:noFill/>
+        </p:spPr>
+        <p:txBody>
+          <a:bodyPr wrap="none" rtlCol="0">
+            <a:spAutoFit/>
+          </a:bodyPr>
+          <a:lstStyle/>
+          <a:p>
+            <a:r>
+              <a:rPr lang="fr-FR" dirty="0"/>
+              <a:t>CPU</a:t>
+            </a:r>
+          </a:p>
+        </p:txBody>
+      </p:sp>
+      <p:cxnSp>
+        <p:nvCxnSpPr>
+          <p:cNvPr id="8" name="Straight Connector 7">
+            <a:extLst>
+              <a:ext uri="{FF2B5EF4-FFF2-40B4-BE49-F238E27FC236}">
+                <a16:creationId xmlns:a16="http://schemas.microsoft.com/office/drawing/2014/main" id="{7133F43D-8AB2-42C9-B817-4DF97B0A1ACD}"/>
+              </a:ext>
+            </a:extLst>
+          </p:cNvPr>
+          <p:cNvCxnSpPr/>
+          <p:nvPr/>
+        </p:nvCxnSpPr>
+        <p:spPr>
+          <a:xfrm>
+            <a:off x="667382" y="650047"/>
+            <a:ext cx="0" cy="1165752"/>
+          </a:xfrm>
+          <a:prstGeom prst="line">
+            <a:avLst/>
+          </a:prstGeom>
+          <a:ln w="76200">
+            <a:solidFill>
+              <a:schemeClr val="accent1"/>
+            </a:solidFill>
+          </a:ln>
+        </p:spPr>
+        <p:style>
+          <a:lnRef idx="1">
+            <a:schemeClr val="accent1"/>
+          </a:lnRef>
+          <a:fillRef idx="0">
+            <a:schemeClr val="accent1"/>
+          </a:fillRef>
+          <a:effectRef idx="0">
+            <a:schemeClr val="accent1"/>
+          </a:effectRef>
+          <a:fontRef idx="minor">
+            <a:schemeClr val="tx1"/>
+          </a:fontRef>
+        </p:style>
+      </p:cxnSp>
+      <p:sp>
+        <p:nvSpPr>
+          <p:cNvPr id="9" name="Rectangle 8">
+            <a:extLst>
+              <a:ext uri="{FF2B5EF4-FFF2-40B4-BE49-F238E27FC236}">
+                <a16:creationId xmlns:a16="http://schemas.microsoft.com/office/drawing/2014/main" id="{098063AE-2B24-452C-A8C9-0337AEC25D4E}"/>
+              </a:ext>
+            </a:extLst>
+          </p:cNvPr>
+          <p:cNvSpPr/>
+          <p:nvPr/>
+        </p:nvSpPr>
+        <p:spPr>
+          <a:xfrm>
+            <a:off x="667382" y="873716"/>
+            <a:ext cx="234015" cy="556370"/>
+          </a:xfrm>
+          <a:prstGeom prst="rect">
+            <a:avLst/>
+          </a:prstGeom>
+        </p:spPr>
+        <p:style>
+          <a:lnRef idx="2">
+            <a:schemeClr val="accent6">
+              <a:shade val="50000"/>
+            </a:schemeClr>
+          </a:lnRef>
+          <a:fillRef idx="1">
+            <a:schemeClr val="accent6"/>
+          </a:fillRef>
+          <a:effectRef idx="0">
+            <a:schemeClr val="accent6"/>
+          </a:effectRef>
+          <a:fontRef idx="minor">
+            <a:schemeClr val="lt1"/>
+          </a:fontRef>
+        </p:style>
+        <p:txBody>
+          <a:bodyPr rtlCol="0" anchor="ctr"/>
+          <a:lstStyle/>
+          <a:p>
+            <a:pPr algn="ctr"/>
+            <a:endParaRPr lang="fr-FR"/>
+          </a:p>
+        </p:txBody>
+      </p:sp>
+      <p:sp>
+        <p:nvSpPr>
+          <p:cNvPr id="22" name="Rectangle 21">
+            <a:extLst>
+              <a:ext uri="{FF2B5EF4-FFF2-40B4-BE49-F238E27FC236}">
+                <a16:creationId xmlns:a16="http://schemas.microsoft.com/office/drawing/2014/main" id="{E83FA6FF-7DA6-432D-9BC1-07B769B6D59E}"/>
+              </a:ext>
+            </a:extLst>
+          </p:cNvPr>
+          <p:cNvSpPr/>
+          <p:nvPr/>
+        </p:nvSpPr>
+        <p:spPr>
+          <a:xfrm>
+            <a:off x="7068181" y="4506997"/>
+            <a:ext cx="2747534" cy="1343428"/>
+          </a:xfrm>
+          <a:prstGeom prst="rect">
+            <a:avLst/>
+          </a:prstGeom>
+        </p:spPr>
+        <p:style>
+          <a:lnRef idx="2">
+            <a:schemeClr val="dk1"/>
+          </a:lnRef>
+          <a:fillRef idx="1">
+            <a:schemeClr val="lt1"/>
+          </a:fillRef>
+          <a:effectRef idx="0">
+            <a:schemeClr val="dk1"/>
+          </a:effectRef>
+          <a:fontRef idx="minor">
+            <a:schemeClr val="dk1"/>
+          </a:fontRef>
+        </p:style>
+        <p:txBody>
+          <a:bodyPr rtlCol="0" anchor="ctr"/>
+          <a:lstStyle/>
+          <a:p>
+            <a:pPr algn="ctr"/>
+            <a:endParaRPr lang="fr-FR"/>
+          </a:p>
+        </p:txBody>
+      </p:sp>
+      <p:sp>
+        <p:nvSpPr>
+          <p:cNvPr id="23" name="Rectangle 22">
+            <a:extLst>
+              <a:ext uri="{FF2B5EF4-FFF2-40B4-BE49-F238E27FC236}">
+                <a16:creationId xmlns:a16="http://schemas.microsoft.com/office/drawing/2014/main" id="{6DA0E0F4-9F31-4C3C-8E62-DB58293D06F6}"/>
+              </a:ext>
+            </a:extLst>
+          </p:cNvPr>
+          <p:cNvSpPr/>
+          <p:nvPr/>
+        </p:nvSpPr>
+        <p:spPr>
+          <a:xfrm>
+            <a:off x="7177605" y="5074703"/>
+            <a:ext cx="1018407" cy="537373"/>
+          </a:xfrm>
+          <a:prstGeom prst="rect">
+            <a:avLst/>
+          </a:prstGeom>
+        </p:spPr>
+        <p:style>
+          <a:lnRef idx="2">
+            <a:schemeClr val="accent1">
+              <a:shade val="50000"/>
+            </a:schemeClr>
+          </a:lnRef>
+          <a:fillRef idx="1">
+            <a:schemeClr val="accent1"/>
+          </a:fillRef>
+          <a:effectRef idx="0">
+            <a:schemeClr val="accent1"/>
+          </a:effectRef>
+          <a:fontRef idx="minor">
+            <a:schemeClr val="lt1"/>
+          </a:fontRef>
+        </p:style>
+        <p:txBody>
+          <a:bodyPr rtlCol="0" anchor="ctr"/>
+          <a:lstStyle/>
+          <a:p>
+            <a:pPr algn="ctr"/>
+            <a:r>
+              <a:rPr lang="fr-FR" dirty="0"/>
+              <a:t>CPU</a:t>
+            </a:r>
+          </a:p>
+        </p:txBody>
+      </p:sp>
+      <p:sp>
+        <p:nvSpPr>
+          <p:cNvPr id="24" name="Rectangle 23">
+            <a:extLst>
+              <a:ext uri="{FF2B5EF4-FFF2-40B4-BE49-F238E27FC236}">
+                <a16:creationId xmlns:a16="http://schemas.microsoft.com/office/drawing/2014/main" id="{0E8D0421-D701-4B9E-8D07-F0962BE0FEAD}"/>
+              </a:ext>
+            </a:extLst>
+          </p:cNvPr>
+          <p:cNvSpPr/>
+          <p:nvPr/>
+        </p:nvSpPr>
+        <p:spPr>
+          <a:xfrm>
+            <a:off x="8914317" y="5074703"/>
+            <a:ext cx="806780" cy="537373"/>
+          </a:xfrm>
+          <a:prstGeom prst="rect">
+            <a:avLst/>
+          </a:prstGeom>
+        </p:spPr>
+        <p:style>
+          <a:lnRef idx="2">
+            <a:schemeClr val="accent1">
+              <a:shade val="50000"/>
+            </a:schemeClr>
+          </a:lnRef>
+          <a:fillRef idx="1">
+            <a:schemeClr val="accent1"/>
+          </a:fillRef>
+          <a:effectRef idx="0">
+            <a:schemeClr val="accent1"/>
+          </a:effectRef>
+          <a:fontRef idx="minor">
+            <a:schemeClr val="lt1"/>
+          </a:fontRef>
+        </p:style>
+        <p:txBody>
+          <a:bodyPr rtlCol="0" anchor="ctr"/>
+          <a:lstStyle/>
+          <a:p>
+            <a:pPr algn="ctr"/>
+            <a:r>
+              <a:rPr lang="fr-FR" dirty="0"/>
+              <a:t>RAM</a:t>
+            </a:r>
+          </a:p>
+        </p:txBody>
+      </p:sp>
+      <p:cxnSp>
+        <p:nvCxnSpPr>
+          <p:cNvPr id="26" name="Straight Arrow Connector 25">
+            <a:extLst>
+              <a:ext uri="{FF2B5EF4-FFF2-40B4-BE49-F238E27FC236}">
+                <a16:creationId xmlns:a16="http://schemas.microsoft.com/office/drawing/2014/main" id="{11046A9E-0E30-47AA-980E-47959EDA92B6}"/>
+              </a:ext>
+            </a:extLst>
+          </p:cNvPr>
+          <p:cNvCxnSpPr>
+            <a:cxnSpLocks/>
+            <a:stCxn id="23" idx="3"/>
+            <a:endCxn id="24" idx="1"/>
+          </p:cNvCxnSpPr>
+          <p:nvPr/>
+        </p:nvCxnSpPr>
+        <p:spPr>
+          <a:xfrm>
+            <a:off x="8196012" y="5343390"/>
+            <a:ext cx="718305" cy="0"/>
+          </a:xfrm>
+          <a:prstGeom prst="straightConnector1">
+            <a:avLst/>
+          </a:prstGeom>
+          <a:ln w="76200">
+            <a:solidFill>
+              <a:schemeClr val="accent1"/>
+            </a:solidFill>
+            <a:headEnd type="triangle"/>
+            <a:tailEnd type="triangle"/>
+          </a:ln>
+        </p:spPr>
+        <p:style>
+          <a:lnRef idx="1">
+            <a:schemeClr val="accent1"/>
+          </a:lnRef>
+          <a:fillRef idx="0">
+            <a:schemeClr val="accent1"/>
+          </a:fillRef>
+          <a:effectRef idx="0">
+            <a:schemeClr val="accent1"/>
+          </a:effectRef>
+          <a:fontRef idx="minor">
+            <a:schemeClr val="tx1"/>
+          </a:fontRef>
+        </p:style>
+      </p:cxnSp>
+      <p:cxnSp>
+        <p:nvCxnSpPr>
+          <p:cNvPr id="31" name="Straight Arrow Connector 30">
+            <a:extLst>
+              <a:ext uri="{FF2B5EF4-FFF2-40B4-BE49-F238E27FC236}">
+                <a16:creationId xmlns:a16="http://schemas.microsoft.com/office/drawing/2014/main" id="{B11F39A1-D672-4CA3-B13E-C4B8175E6908}"/>
+              </a:ext>
+            </a:extLst>
+          </p:cNvPr>
+          <p:cNvCxnSpPr/>
+          <p:nvPr/>
+        </p:nvCxnSpPr>
+        <p:spPr>
+          <a:xfrm flipV="1">
+            <a:off x="7700895" y="3666267"/>
+            <a:ext cx="0" cy="1408436"/>
+          </a:xfrm>
+          <a:prstGeom prst="straightConnector1">
+            <a:avLst/>
+          </a:prstGeom>
+          <a:ln w="76200">
+            <a:solidFill>
+              <a:schemeClr val="accent1"/>
+            </a:solidFill>
+            <a:headEnd type="triangle"/>
+            <a:tailEnd type="triangle"/>
+          </a:ln>
+        </p:spPr>
+        <p:style>
+          <a:lnRef idx="1">
+            <a:schemeClr val="accent1"/>
+          </a:lnRef>
+          <a:fillRef idx="0">
+            <a:schemeClr val="accent1"/>
+          </a:fillRef>
+          <a:effectRef idx="0">
+            <a:schemeClr val="accent1"/>
+          </a:effectRef>
+          <a:fontRef idx="minor">
+            <a:schemeClr val="tx1"/>
+          </a:fontRef>
+        </p:style>
+      </p:cxnSp>
+      <p:sp>
+        <p:nvSpPr>
+          <p:cNvPr id="32" name="Rectangle: Rounded Corners 31">
+            <a:extLst>
+              <a:ext uri="{FF2B5EF4-FFF2-40B4-BE49-F238E27FC236}">
+                <a16:creationId xmlns:a16="http://schemas.microsoft.com/office/drawing/2014/main" id="{8ADD77CA-7E59-4747-AAB2-811F038B64DE}"/>
+              </a:ext>
+            </a:extLst>
+          </p:cNvPr>
+          <p:cNvSpPr/>
+          <p:nvPr/>
+        </p:nvSpPr>
+        <p:spPr>
+          <a:xfrm>
+            <a:off x="7177605" y="3081225"/>
+            <a:ext cx="1051994" cy="585040"/>
+          </a:xfrm>
+          <a:prstGeom prst="roundRect">
+            <a:avLst/>
+          </a:prstGeom>
+        </p:spPr>
+        <p:style>
+          <a:lnRef idx="2">
+            <a:schemeClr val="accent1">
+              <a:shade val="50000"/>
+            </a:schemeClr>
+          </a:lnRef>
+          <a:fillRef idx="1">
+            <a:schemeClr val="accent1"/>
+          </a:fillRef>
+          <a:effectRef idx="0">
+            <a:schemeClr val="accent1"/>
+          </a:effectRef>
+          <a:fontRef idx="minor">
+            <a:schemeClr val="lt1"/>
+          </a:fontRef>
+        </p:style>
+        <p:txBody>
+          <a:bodyPr rtlCol="0" anchor="ctr"/>
+          <a:lstStyle/>
+          <a:p>
+            <a:pPr algn="ctr"/>
+            <a:r>
+              <a:rPr lang="fr-FR" dirty="0" err="1"/>
+              <a:t>CtrlDD</a:t>
+            </a:r>
+            <a:endParaRPr lang="fr-FR" dirty="0"/>
+          </a:p>
+        </p:txBody>
+      </p:sp>
+      <p:cxnSp>
+        <p:nvCxnSpPr>
+          <p:cNvPr id="34" name="Straight Arrow Connector 33">
+            <a:extLst>
+              <a:ext uri="{FF2B5EF4-FFF2-40B4-BE49-F238E27FC236}">
+                <a16:creationId xmlns:a16="http://schemas.microsoft.com/office/drawing/2014/main" id="{62068FCB-EA8A-4738-BCF3-2C3F1C93BCF0}"/>
+              </a:ext>
+            </a:extLst>
+          </p:cNvPr>
+          <p:cNvCxnSpPr>
+            <a:stCxn id="32" idx="3"/>
+          </p:cNvCxnSpPr>
+          <p:nvPr/>
+        </p:nvCxnSpPr>
+        <p:spPr>
+          <a:xfrm flipV="1">
+            <a:off x="8229599" y="3362912"/>
+            <a:ext cx="1924141" cy="10833"/>
+          </a:xfrm>
+          <a:prstGeom prst="straightConnector1">
+            <a:avLst/>
+          </a:prstGeom>
+          <a:ln w="76200">
+            <a:solidFill>
+              <a:schemeClr val="accent1"/>
+            </a:solidFill>
+            <a:headEnd type="triangle"/>
+            <a:tailEnd type="triangle"/>
+          </a:ln>
+        </p:spPr>
+        <p:style>
+          <a:lnRef idx="1">
+            <a:schemeClr val="accent1"/>
+          </a:lnRef>
+          <a:fillRef idx="0">
+            <a:schemeClr val="accent1"/>
+          </a:fillRef>
+          <a:effectRef idx="0">
+            <a:schemeClr val="accent1"/>
+          </a:effectRef>
+          <a:fontRef idx="minor">
+            <a:schemeClr val="tx1"/>
+          </a:fontRef>
+        </p:style>
+      </p:cxnSp>
+      <p:sp>
+        <p:nvSpPr>
+          <p:cNvPr id="35" name="Cylinder 34">
+            <a:extLst>
+              <a:ext uri="{FF2B5EF4-FFF2-40B4-BE49-F238E27FC236}">
+                <a16:creationId xmlns:a16="http://schemas.microsoft.com/office/drawing/2014/main" id="{96DFC901-52FD-42F0-AB36-69C948FB3C70}"/>
+              </a:ext>
+            </a:extLst>
+          </p:cNvPr>
+          <p:cNvSpPr/>
+          <p:nvPr/>
+        </p:nvSpPr>
+        <p:spPr>
+          <a:xfrm>
+            <a:off x="10106070" y="2991189"/>
+            <a:ext cx="1924141" cy="304440"/>
+          </a:xfrm>
+          <a:prstGeom prst="can">
+            <a:avLst/>
+          </a:prstGeom>
+        </p:spPr>
+        <p:style>
+          <a:lnRef idx="2">
+            <a:schemeClr val="accent1">
+              <a:shade val="50000"/>
+            </a:schemeClr>
+          </a:lnRef>
+          <a:fillRef idx="1">
+            <a:schemeClr val="accent1"/>
+          </a:fillRef>
+          <a:effectRef idx="0">
+            <a:schemeClr val="accent1"/>
+          </a:effectRef>
+          <a:fontRef idx="minor">
+            <a:schemeClr val="lt1"/>
+          </a:fontRef>
+        </p:style>
+        <p:txBody>
+          <a:bodyPr rtlCol="0" anchor="ctr"/>
+          <a:lstStyle/>
+          <a:p>
+            <a:pPr algn="ctr"/>
+            <a:endParaRPr lang="fr-FR"/>
+          </a:p>
+        </p:txBody>
+      </p:sp>
+      <p:sp>
+        <p:nvSpPr>
+          <p:cNvPr id="36" name="Cylinder 35">
+            <a:extLst>
+              <a:ext uri="{FF2B5EF4-FFF2-40B4-BE49-F238E27FC236}">
+                <a16:creationId xmlns:a16="http://schemas.microsoft.com/office/drawing/2014/main" id="{610FEDB5-E16E-45DA-A04E-3ECAE162E1D0}"/>
+              </a:ext>
+            </a:extLst>
+          </p:cNvPr>
+          <p:cNvSpPr/>
+          <p:nvPr/>
+        </p:nvSpPr>
+        <p:spPr>
+          <a:xfrm>
+            <a:off x="10106070" y="3429000"/>
+            <a:ext cx="1924141" cy="304440"/>
+          </a:xfrm>
+          <a:prstGeom prst="can">
+            <a:avLst/>
+          </a:prstGeom>
+        </p:spPr>
+        <p:style>
+          <a:lnRef idx="2">
+            <a:schemeClr val="accent1">
+              <a:shade val="50000"/>
+            </a:schemeClr>
+          </a:lnRef>
+          <a:fillRef idx="1">
+            <a:schemeClr val="accent1"/>
+          </a:fillRef>
+          <a:effectRef idx="0">
+            <a:schemeClr val="accent1"/>
+          </a:effectRef>
+          <a:fontRef idx="minor">
+            <a:schemeClr val="lt1"/>
+          </a:fontRef>
+        </p:style>
+        <p:txBody>
+          <a:bodyPr rtlCol="0" anchor="ctr"/>
+          <a:lstStyle/>
+          <a:p>
+            <a:pPr algn="ctr"/>
+            <a:endParaRPr lang="fr-FR"/>
+          </a:p>
+        </p:txBody>
+      </p:sp>
+      <p:cxnSp>
+        <p:nvCxnSpPr>
+          <p:cNvPr id="37" name="Straight Arrow Connector 36">
+            <a:extLst>
+              <a:ext uri="{FF2B5EF4-FFF2-40B4-BE49-F238E27FC236}">
+                <a16:creationId xmlns:a16="http://schemas.microsoft.com/office/drawing/2014/main" id="{16509116-F21E-4AC1-BF6E-1F3DEAEB1036}"/>
+              </a:ext>
+            </a:extLst>
+          </p:cNvPr>
+          <p:cNvCxnSpPr>
+            <a:cxnSpLocks/>
+            <a:stCxn id="24" idx="0"/>
+          </p:cNvCxnSpPr>
+          <p:nvPr/>
+        </p:nvCxnSpPr>
+        <p:spPr>
+          <a:xfrm flipH="1" flipV="1">
+            <a:off x="7973915" y="3666265"/>
+            <a:ext cx="1343792" cy="1408438"/>
+          </a:xfrm>
+          <a:prstGeom prst="straightConnector1">
+            <a:avLst/>
+          </a:prstGeom>
+          <a:ln w="76200">
+            <a:solidFill>
+              <a:schemeClr val="accent1"/>
+            </a:solidFill>
+            <a:headEnd type="triangle"/>
+            <a:tailEnd type="triangle"/>
+          </a:ln>
+        </p:spPr>
+        <p:style>
+          <a:lnRef idx="1">
+            <a:schemeClr val="accent1"/>
+          </a:lnRef>
+          <a:fillRef idx="0">
+            <a:schemeClr val="accent1"/>
+          </a:fillRef>
+          <a:effectRef idx="0">
+            <a:schemeClr val="accent1"/>
+          </a:effectRef>
+          <a:fontRef idx="minor">
+            <a:schemeClr val="tx1"/>
+          </a:fontRef>
+        </p:style>
+      </p:cxnSp>
+      <p:cxnSp>
+        <p:nvCxnSpPr>
+          <p:cNvPr id="41" name="Straight Arrow Connector 40">
+            <a:extLst>
+              <a:ext uri="{FF2B5EF4-FFF2-40B4-BE49-F238E27FC236}">
+                <a16:creationId xmlns:a16="http://schemas.microsoft.com/office/drawing/2014/main" id="{D526155A-36D8-4496-97D6-C4D06E089BBE}"/>
+              </a:ext>
+            </a:extLst>
+          </p:cNvPr>
+          <p:cNvCxnSpPr/>
+          <p:nvPr/>
+        </p:nvCxnSpPr>
+        <p:spPr>
+          <a:xfrm>
+            <a:off x="294688" y="2197160"/>
+            <a:ext cx="11575177" cy="0"/>
+          </a:xfrm>
+          <a:prstGeom prst="straightConnector1">
+            <a:avLst/>
+          </a:prstGeom>
+          <a:ln w="76200">
+            <a:solidFill>
+              <a:schemeClr val="accent1"/>
+            </a:solidFill>
+            <a:tailEnd type="triangle"/>
+          </a:ln>
+        </p:spPr>
+        <p:style>
+          <a:lnRef idx="1">
+            <a:schemeClr val="accent1"/>
+          </a:lnRef>
+          <a:fillRef idx="0">
+            <a:schemeClr val="accent1"/>
+          </a:fillRef>
+          <a:effectRef idx="0">
+            <a:schemeClr val="accent1"/>
+          </a:effectRef>
+          <a:fontRef idx="minor">
+            <a:schemeClr val="tx1"/>
+          </a:fontRef>
+        </p:style>
+      </p:cxnSp>
+      <p:sp>
+        <p:nvSpPr>
+          <p:cNvPr id="42" name="TextBox 41">
+            <a:extLst>
+              <a:ext uri="{FF2B5EF4-FFF2-40B4-BE49-F238E27FC236}">
+                <a16:creationId xmlns:a16="http://schemas.microsoft.com/office/drawing/2014/main" id="{A9146B88-47D4-47D9-9F68-40E2539B3233}"/>
+              </a:ext>
+            </a:extLst>
+          </p:cNvPr>
+          <p:cNvSpPr txBox="1"/>
+          <p:nvPr/>
+        </p:nvSpPr>
+        <p:spPr>
+          <a:xfrm>
+            <a:off x="10796569" y="1781131"/>
+            <a:ext cx="803425" cy="369332"/>
+          </a:xfrm>
+          <a:prstGeom prst="rect">
+            <a:avLst/>
+          </a:prstGeom>
+          <a:noFill/>
+        </p:spPr>
+        <p:txBody>
+          <a:bodyPr wrap="none" rtlCol="0">
+            <a:spAutoFit/>
+          </a:bodyPr>
+          <a:lstStyle/>
+          <a:p>
+            <a:r>
+              <a:rPr lang="fr-FR" dirty="0" err="1"/>
+              <a:t>CtrlDD</a:t>
+            </a:r>
+            <a:endParaRPr lang="fr-FR" dirty="0"/>
+          </a:p>
+        </p:txBody>
+      </p:sp>
+      <p:cxnSp>
+        <p:nvCxnSpPr>
+          <p:cNvPr id="44" name="Straight Arrow Connector 43">
+            <a:extLst>
+              <a:ext uri="{FF2B5EF4-FFF2-40B4-BE49-F238E27FC236}">
+                <a16:creationId xmlns:a16="http://schemas.microsoft.com/office/drawing/2014/main" id="{90A94BF1-1D71-4C97-8D93-484103ACEB9C}"/>
+              </a:ext>
+            </a:extLst>
+          </p:cNvPr>
+          <p:cNvCxnSpPr/>
+          <p:nvPr/>
+        </p:nvCxnSpPr>
+        <p:spPr>
+          <a:xfrm>
+            <a:off x="762719" y="1525445"/>
+            <a:ext cx="95338" cy="706384"/>
+          </a:xfrm>
+          <a:prstGeom prst="straightConnector1">
+            <a:avLst/>
+          </a:prstGeom>
+          <a:ln w="76200">
+            <a:solidFill>
+              <a:schemeClr val="accent1"/>
+            </a:solidFill>
+            <a:tailEnd type="triangle"/>
+          </a:ln>
+        </p:spPr>
+        <p:style>
+          <a:lnRef idx="1">
+            <a:schemeClr val="accent1"/>
+          </a:lnRef>
+          <a:fillRef idx="0">
+            <a:schemeClr val="accent1"/>
+          </a:fillRef>
+          <a:effectRef idx="0">
+            <a:schemeClr val="accent1"/>
+          </a:effectRef>
+          <a:fontRef idx="minor">
+            <a:schemeClr val="tx1"/>
+          </a:fontRef>
+        </p:style>
+      </p:cxnSp>
+      <p:sp>
+        <p:nvSpPr>
+          <p:cNvPr id="45" name="Rectangle 44">
+            <a:extLst>
+              <a:ext uri="{FF2B5EF4-FFF2-40B4-BE49-F238E27FC236}">
+                <a16:creationId xmlns:a16="http://schemas.microsoft.com/office/drawing/2014/main" id="{5AE03E74-3F3F-4FC5-955F-66227E4EF8C9}"/>
+              </a:ext>
+            </a:extLst>
+          </p:cNvPr>
+          <p:cNvSpPr/>
+          <p:nvPr/>
+        </p:nvSpPr>
+        <p:spPr>
+          <a:xfrm>
+            <a:off x="901399" y="1965797"/>
+            <a:ext cx="8416308" cy="495707"/>
+          </a:xfrm>
+          <a:prstGeom prst="rect">
+            <a:avLst/>
+          </a:prstGeom>
+        </p:spPr>
+        <p:style>
+          <a:lnRef idx="2">
+            <a:schemeClr val="accent1">
+              <a:shade val="50000"/>
+            </a:schemeClr>
+          </a:lnRef>
+          <a:fillRef idx="1">
+            <a:schemeClr val="accent1"/>
+          </a:fillRef>
+          <a:effectRef idx="0">
+            <a:schemeClr val="accent1"/>
+          </a:effectRef>
+          <a:fontRef idx="minor">
+            <a:schemeClr val="lt1"/>
+          </a:fontRef>
+        </p:style>
+        <p:txBody>
+          <a:bodyPr rtlCol="0" anchor="ctr"/>
+          <a:lstStyle/>
+          <a:p>
+            <a:pPr algn="ctr"/>
+            <a:endParaRPr lang="fr-FR"/>
+          </a:p>
+        </p:txBody>
+      </p:sp>
+      <p:cxnSp>
+        <p:nvCxnSpPr>
+          <p:cNvPr id="47" name="Straight Arrow Connector 46">
+            <a:extLst>
+              <a:ext uri="{FF2B5EF4-FFF2-40B4-BE49-F238E27FC236}">
+                <a16:creationId xmlns:a16="http://schemas.microsoft.com/office/drawing/2014/main" id="{9B99956C-6F4A-4EAF-B2E4-D5B98FBDD99F}"/>
+              </a:ext>
+            </a:extLst>
+          </p:cNvPr>
+          <p:cNvCxnSpPr/>
+          <p:nvPr/>
+        </p:nvCxnSpPr>
+        <p:spPr>
+          <a:xfrm flipV="1">
+            <a:off x="9222369" y="1148417"/>
+            <a:ext cx="129646" cy="728047"/>
+          </a:xfrm>
+          <a:prstGeom prst="straightConnector1">
+            <a:avLst/>
+          </a:prstGeom>
+          <a:ln w="76200">
+            <a:solidFill>
+              <a:schemeClr val="accent1"/>
+            </a:solidFill>
+            <a:tailEnd type="triangle"/>
+          </a:ln>
+        </p:spPr>
+        <p:style>
+          <a:lnRef idx="1">
+            <a:schemeClr val="accent1"/>
+          </a:lnRef>
+          <a:fillRef idx="0">
+            <a:schemeClr val="accent1"/>
+          </a:fillRef>
+          <a:effectRef idx="0">
+            <a:schemeClr val="accent1"/>
+          </a:effectRef>
+          <a:fontRef idx="minor">
+            <a:schemeClr val="tx1"/>
+          </a:fontRef>
+        </p:style>
+      </p:cxnSp>
+      <p:cxnSp>
+        <p:nvCxnSpPr>
+          <p:cNvPr id="49" name="Straight Connector 48">
+            <a:extLst>
+              <a:ext uri="{FF2B5EF4-FFF2-40B4-BE49-F238E27FC236}">
+                <a16:creationId xmlns:a16="http://schemas.microsoft.com/office/drawing/2014/main" id="{CD6F1138-1BFB-4FF8-AB78-37E8D14B06C5}"/>
+              </a:ext>
+            </a:extLst>
+          </p:cNvPr>
+          <p:cNvCxnSpPr/>
+          <p:nvPr/>
+        </p:nvCxnSpPr>
+        <p:spPr>
+          <a:xfrm>
+            <a:off x="9434355" y="719386"/>
+            <a:ext cx="0" cy="1031408"/>
+          </a:xfrm>
+          <a:prstGeom prst="line">
+            <a:avLst/>
+          </a:prstGeom>
+          <a:ln w="76200">
+            <a:solidFill>
+              <a:schemeClr val="accent1"/>
+            </a:solidFill>
+          </a:ln>
+        </p:spPr>
+        <p:style>
+          <a:lnRef idx="1">
+            <a:schemeClr val="accent1"/>
+          </a:lnRef>
+          <a:fillRef idx="0">
+            <a:schemeClr val="accent1"/>
+          </a:fillRef>
+          <a:effectRef idx="0">
+            <a:schemeClr val="accent1"/>
+          </a:effectRef>
+          <a:fontRef idx="minor">
+            <a:schemeClr val="tx1"/>
+          </a:fontRef>
+        </p:style>
+      </p:cxnSp>
+      <p:sp>
+        <p:nvSpPr>
+          <p:cNvPr id="51" name="Rectangle 50">
+            <a:extLst>
+              <a:ext uri="{FF2B5EF4-FFF2-40B4-BE49-F238E27FC236}">
+                <a16:creationId xmlns:a16="http://schemas.microsoft.com/office/drawing/2014/main" id="{809E5A19-3556-4C7A-8D8B-F962CBB46539}"/>
+              </a:ext>
+            </a:extLst>
+          </p:cNvPr>
+          <p:cNvSpPr/>
+          <p:nvPr/>
+        </p:nvSpPr>
+        <p:spPr>
+          <a:xfrm>
+            <a:off x="9434355" y="873716"/>
+            <a:ext cx="190669" cy="556370"/>
+          </a:xfrm>
+          <a:prstGeom prst="rect">
+            <a:avLst/>
+          </a:prstGeom>
+        </p:spPr>
+        <p:style>
+          <a:lnRef idx="2">
+            <a:schemeClr val="accent6">
+              <a:shade val="50000"/>
+            </a:schemeClr>
+          </a:lnRef>
+          <a:fillRef idx="1">
+            <a:schemeClr val="accent6"/>
+          </a:fillRef>
+          <a:effectRef idx="0">
+            <a:schemeClr val="accent6"/>
+          </a:effectRef>
+          <a:fontRef idx="minor">
+            <a:schemeClr val="lt1"/>
+          </a:fontRef>
+        </p:style>
+        <p:txBody>
+          <a:bodyPr rtlCol="0" anchor="ctr"/>
+          <a:lstStyle/>
+          <a:p>
+            <a:pPr algn="ctr"/>
+            <a:endParaRPr lang="fr-FR"/>
+          </a:p>
+        </p:txBody>
+      </p:sp>
+      <p:cxnSp>
+        <p:nvCxnSpPr>
+          <p:cNvPr id="53" name="Straight Connector 52">
+            <a:extLst>
+              <a:ext uri="{FF2B5EF4-FFF2-40B4-BE49-F238E27FC236}">
+                <a16:creationId xmlns:a16="http://schemas.microsoft.com/office/drawing/2014/main" id="{217E3CB4-6F36-42AB-9172-2F9A22E527C7}"/>
+              </a:ext>
+            </a:extLst>
+          </p:cNvPr>
+          <p:cNvCxnSpPr/>
+          <p:nvPr/>
+        </p:nvCxnSpPr>
+        <p:spPr>
+          <a:xfrm>
+            <a:off x="3700936" y="602377"/>
+            <a:ext cx="0" cy="1009741"/>
+          </a:xfrm>
+          <a:prstGeom prst="line">
+            <a:avLst/>
+          </a:prstGeom>
+          <a:ln w="76200">
+            <a:solidFill>
+              <a:schemeClr val="accent1"/>
+            </a:solidFill>
+          </a:ln>
+        </p:spPr>
+        <p:style>
+          <a:lnRef idx="1">
+            <a:schemeClr val="accent1"/>
+          </a:lnRef>
+          <a:fillRef idx="0">
+            <a:schemeClr val="accent1"/>
+          </a:fillRef>
+          <a:effectRef idx="0">
+            <a:schemeClr val="accent1"/>
+          </a:effectRef>
+          <a:fontRef idx="minor">
+            <a:schemeClr val="tx1"/>
+          </a:fontRef>
+        </p:style>
+      </p:cxnSp>
+      <p:sp>
+        <p:nvSpPr>
+          <p:cNvPr id="54" name="Rectangle 53">
+            <a:extLst>
+              <a:ext uri="{FF2B5EF4-FFF2-40B4-BE49-F238E27FC236}">
+                <a16:creationId xmlns:a16="http://schemas.microsoft.com/office/drawing/2014/main" id="{BE985B63-D2AD-45D5-B7A9-E8C6419D15C3}"/>
+              </a:ext>
+            </a:extLst>
+          </p:cNvPr>
+          <p:cNvSpPr/>
+          <p:nvPr/>
+        </p:nvSpPr>
+        <p:spPr>
+          <a:xfrm>
+            <a:off x="3748608" y="914400"/>
+            <a:ext cx="86672" cy="431676"/>
+          </a:xfrm>
+          <a:prstGeom prst="rect">
+            <a:avLst/>
+          </a:prstGeom>
+        </p:spPr>
+        <p:style>
+          <a:lnRef idx="2">
+            <a:schemeClr val="accent1">
+              <a:shade val="50000"/>
+            </a:schemeClr>
+          </a:lnRef>
+          <a:fillRef idx="1">
+            <a:schemeClr val="accent1"/>
+          </a:fillRef>
+          <a:effectRef idx="0">
+            <a:schemeClr val="accent1"/>
+          </a:effectRef>
+          <a:fontRef idx="minor">
+            <a:schemeClr val="lt1"/>
+          </a:fontRef>
+        </p:style>
+        <p:txBody>
+          <a:bodyPr rtlCol="0" anchor="ctr"/>
+          <a:lstStyle/>
+          <a:p>
+            <a:pPr algn="ctr"/>
+            <a:endParaRPr lang="fr-FR"/>
+          </a:p>
+        </p:txBody>
+      </p:sp>
+      <p:cxnSp>
+        <p:nvCxnSpPr>
+          <p:cNvPr id="56" name="Straight Connector 55">
+            <a:extLst>
+              <a:ext uri="{FF2B5EF4-FFF2-40B4-BE49-F238E27FC236}">
+                <a16:creationId xmlns:a16="http://schemas.microsoft.com/office/drawing/2014/main" id="{F1984E87-DEC6-48E4-868D-4AB75F862B12}"/>
+              </a:ext>
+            </a:extLst>
+          </p:cNvPr>
+          <p:cNvCxnSpPr/>
+          <p:nvPr/>
+        </p:nvCxnSpPr>
+        <p:spPr>
+          <a:xfrm>
+            <a:off x="5902430" y="650047"/>
+            <a:ext cx="0" cy="1044410"/>
+          </a:xfrm>
+          <a:prstGeom prst="line">
+            <a:avLst/>
+          </a:prstGeom>
+          <a:ln w="76200">
+            <a:solidFill>
+              <a:schemeClr val="accent1"/>
+            </a:solidFill>
+          </a:ln>
+        </p:spPr>
+        <p:style>
+          <a:lnRef idx="1">
+            <a:schemeClr val="accent1"/>
+          </a:lnRef>
+          <a:fillRef idx="0">
+            <a:schemeClr val="accent1"/>
+          </a:fillRef>
+          <a:effectRef idx="0">
+            <a:schemeClr val="accent1"/>
+          </a:effectRef>
+          <a:fontRef idx="minor">
+            <a:schemeClr val="tx1"/>
+          </a:fontRef>
+        </p:style>
+      </p:cxnSp>
+      <p:sp>
+        <p:nvSpPr>
+          <p:cNvPr id="57" name="Rectangle 56">
+            <a:extLst>
+              <a:ext uri="{FF2B5EF4-FFF2-40B4-BE49-F238E27FC236}">
+                <a16:creationId xmlns:a16="http://schemas.microsoft.com/office/drawing/2014/main" id="{0199334D-6B42-4DDD-A3B9-E5EACE0BA18C}"/>
+              </a:ext>
+            </a:extLst>
+          </p:cNvPr>
+          <p:cNvSpPr/>
+          <p:nvPr/>
+        </p:nvSpPr>
+        <p:spPr>
+          <a:xfrm>
+            <a:off x="5932767" y="840728"/>
+            <a:ext cx="104006" cy="589358"/>
+          </a:xfrm>
+          <a:prstGeom prst="rect">
+            <a:avLst/>
+          </a:prstGeom>
+        </p:spPr>
+        <p:style>
+          <a:lnRef idx="2">
+            <a:schemeClr val="accent1">
+              <a:shade val="50000"/>
+            </a:schemeClr>
+          </a:lnRef>
+          <a:fillRef idx="1">
+            <a:schemeClr val="accent1"/>
+          </a:fillRef>
+          <a:effectRef idx="0">
+            <a:schemeClr val="accent1"/>
+          </a:effectRef>
+          <a:fontRef idx="minor">
+            <a:schemeClr val="lt1"/>
+          </a:fontRef>
+        </p:style>
+        <p:txBody>
+          <a:bodyPr rtlCol="0" anchor="ctr"/>
+          <a:lstStyle/>
+          <a:p>
+            <a:pPr algn="ctr"/>
+            <a:endParaRPr lang="fr-FR"/>
+          </a:p>
+        </p:txBody>
+      </p:sp>
+      <p:cxnSp>
+        <p:nvCxnSpPr>
+          <p:cNvPr id="59" name="Straight Arrow Connector 58">
+            <a:extLst>
+              <a:ext uri="{FF2B5EF4-FFF2-40B4-BE49-F238E27FC236}">
+                <a16:creationId xmlns:a16="http://schemas.microsoft.com/office/drawing/2014/main" id="{350DEA82-8ED6-4CF3-8168-5C174F104F50}"/>
+              </a:ext>
+            </a:extLst>
+          </p:cNvPr>
+          <p:cNvCxnSpPr>
+            <a:cxnSpLocks/>
+          </p:cNvCxnSpPr>
+          <p:nvPr/>
+        </p:nvCxnSpPr>
+        <p:spPr>
+          <a:xfrm>
+            <a:off x="901396" y="1430085"/>
+            <a:ext cx="95337" cy="495707"/>
+          </a:xfrm>
+          <a:prstGeom prst="straightConnector1">
+            <a:avLst/>
+          </a:prstGeom>
+          <a:ln w="76200">
+            <a:solidFill>
+              <a:schemeClr val="accent1"/>
+            </a:solidFill>
+            <a:tailEnd type="triangle"/>
+          </a:ln>
+        </p:spPr>
+        <p:style>
+          <a:lnRef idx="1">
+            <a:schemeClr val="accent1"/>
+          </a:lnRef>
+          <a:fillRef idx="0">
+            <a:schemeClr val="accent1"/>
+          </a:fillRef>
+          <a:effectRef idx="0">
+            <a:schemeClr val="accent1"/>
+          </a:effectRef>
+          <a:fontRef idx="minor">
+            <a:schemeClr val="tx1"/>
+          </a:fontRef>
+        </p:style>
+      </p:cxnSp>
+      <p:cxnSp>
+        <p:nvCxnSpPr>
+          <p:cNvPr id="62" name="Straight Arrow Connector 61">
+            <a:extLst>
+              <a:ext uri="{FF2B5EF4-FFF2-40B4-BE49-F238E27FC236}">
+                <a16:creationId xmlns:a16="http://schemas.microsoft.com/office/drawing/2014/main" id="{0F926828-98F4-4B70-95C6-964E384F3FA3}"/>
+              </a:ext>
+            </a:extLst>
+          </p:cNvPr>
+          <p:cNvCxnSpPr/>
+          <p:nvPr/>
+        </p:nvCxnSpPr>
+        <p:spPr>
+          <a:xfrm>
+            <a:off x="1031042" y="1430085"/>
+            <a:ext cx="212715" cy="446379"/>
+          </a:xfrm>
+          <a:prstGeom prst="straightConnector1">
+            <a:avLst/>
+          </a:prstGeom>
+          <a:ln w="76200">
+            <a:solidFill>
+              <a:schemeClr val="accent1"/>
+            </a:solidFill>
+            <a:tailEnd type="triangle"/>
+          </a:ln>
+        </p:spPr>
+        <p:style>
+          <a:lnRef idx="1">
+            <a:schemeClr val="accent1"/>
+          </a:lnRef>
+          <a:fillRef idx="0">
+            <a:schemeClr val="accent1"/>
+          </a:fillRef>
+          <a:effectRef idx="0">
+            <a:schemeClr val="accent1"/>
+          </a:effectRef>
+          <a:fontRef idx="minor">
+            <a:schemeClr val="tx1"/>
+          </a:fontRef>
+        </p:style>
+      </p:cxnSp>
+      <p:cxnSp>
+        <p:nvCxnSpPr>
+          <p:cNvPr id="64" name="Straight Arrow Connector 63">
+            <a:extLst>
+              <a:ext uri="{FF2B5EF4-FFF2-40B4-BE49-F238E27FC236}">
+                <a16:creationId xmlns:a16="http://schemas.microsoft.com/office/drawing/2014/main" id="{69B5BB07-E98F-4BCD-92F5-671F9A88EA01}"/>
+              </a:ext>
+            </a:extLst>
+          </p:cNvPr>
+          <p:cNvCxnSpPr/>
+          <p:nvPr/>
+        </p:nvCxnSpPr>
+        <p:spPr>
+          <a:xfrm>
+            <a:off x="1191754" y="1430085"/>
+            <a:ext cx="398695" cy="495707"/>
+          </a:xfrm>
+          <a:prstGeom prst="straightConnector1">
+            <a:avLst/>
+          </a:prstGeom>
+          <a:ln w="76200">
+            <a:solidFill>
+              <a:schemeClr val="accent1"/>
+            </a:solidFill>
+            <a:tailEnd type="triangle"/>
+          </a:ln>
+        </p:spPr>
+        <p:style>
+          <a:lnRef idx="1">
+            <a:schemeClr val="accent1"/>
+          </a:lnRef>
+          <a:fillRef idx="0">
+            <a:schemeClr val="accent1"/>
+          </a:fillRef>
+          <a:effectRef idx="0">
+            <a:schemeClr val="accent1"/>
+          </a:effectRef>
+          <a:fontRef idx="minor">
+            <a:schemeClr val="tx1"/>
+          </a:fontRef>
+        </p:style>
+      </p:cxnSp>
+      <p:sp>
+        <p:nvSpPr>
+          <p:cNvPr id="65" name="Rectangle 64">
+            <a:extLst>
+              <a:ext uri="{FF2B5EF4-FFF2-40B4-BE49-F238E27FC236}">
+                <a16:creationId xmlns:a16="http://schemas.microsoft.com/office/drawing/2014/main" id="{DABC3A74-CBD1-4D91-A538-BF2A6F4083ED}"/>
+              </a:ext>
+            </a:extLst>
+          </p:cNvPr>
+          <p:cNvSpPr/>
+          <p:nvPr/>
+        </p:nvSpPr>
+        <p:spPr>
+          <a:xfrm>
+            <a:off x="1114114" y="2231829"/>
+            <a:ext cx="8276904" cy="461037"/>
+          </a:xfrm>
+          <a:prstGeom prst="rect">
+            <a:avLst/>
+          </a:prstGeom>
+        </p:spPr>
+        <p:style>
+          <a:lnRef idx="2">
+            <a:schemeClr val="accent1">
+              <a:shade val="50000"/>
+            </a:schemeClr>
+          </a:lnRef>
+          <a:fillRef idx="1">
+            <a:schemeClr val="accent1"/>
+          </a:fillRef>
+          <a:effectRef idx="0">
+            <a:schemeClr val="accent1"/>
+          </a:effectRef>
+          <a:fontRef idx="minor">
+            <a:schemeClr val="lt1"/>
+          </a:fontRef>
+        </p:style>
+        <p:txBody>
+          <a:bodyPr rtlCol="0" anchor="ctr"/>
+          <a:lstStyle/>
+          <a:p>
+            <a:pPr algn="ctr"/>
+            <a:endParaRPr lang="fr-FR" dirty="0"/>
+          </a:p>
+        </p:txBody>
+      </p:sp>
+    </p:spTree>
+    <p:extLst>
+      <p:ext uri="{BB962C8B-B14F-4D97-AF65-F5344CB8AC3E}">
+        <p14:creationId xmlns:p14="http://schemas.microsoft.com/office/powerpoint/2010/main" val="3484896175"/>
       </p:ext>
     </p:extLst>
   </p:cSld>
@@ -5491,7 +7673,7 @@
         <p:spPr>
           <a:xfrm>
             <a:off x="5776755" y="5022700"/>
-            <a:ext cx="2010807" cy="1477328"/>
+            <a:ext cx="2010807" cy="1754326"/>
           </a:xfrm>
           <a:prstGeom prst="rect">
             <a:avLst/>
@@ -5544,6 +7726,12 @@
             <a:r>
               <a:rPr lang="fr-FR" dirty="0"/>
               <a:t>() =&gt; {}</a:t>
+            </a:r>
+          </a:p>
+          <a:p>
+            <a:r>
+              <a:rPr lang="fr-FR" dirty="0"/>
+              <a:t>import/export</a:t>
             </a:r>
           </a:p>
         </p:txBody>

</xml_diff>